<commit_message>
Correct path on slide
</commit_message>
<xml_diff>
--- a/Workshop/Module3-ConnectedApps/Slides/CodeLabs-UWP Connected Introduction.pptx
+++ b/Workshop/Module3-ConnectedApps/Slides/CodeLabs-UWP Connected Introduction.pptx
@@ -301,7 +301,7 @@
               <a:rPr lang="en-US" smtClean="0">
                 <a:latin typeface="Segoe UI" pitchFamily="34" charset="0"/>
               </a:rPr>
-              <a:t>3/30/2016 8:33 AM</a:t>
+              <a:t>4/1/2016 10:11 AM</a:t>
             </a:fld>
             <a:endParaRPr lang="en-US" dirty="0">
               <a:latin typeface="Segoe UI" pitchFamily="34" charset="0"/>
@@ -582,7 +582,7 @@
           <a:p>
             <a:fld id="{38EEC551-8CDA-4EB6-89BB-2A86C9F091C8}" type="datetime8">
               <a:rPr lang="en-US" smtClean="0"/>
-              <a:t>3/30/2016 8:33 AM</a:t>
+              <a:t>4/1/2016 10:11 AM</a:t>
             </a:fld>
             <a:endParaRPr lang="en-US" dirty="0"/>
           </a:p>
@@ -1332,7 +1332,7 @@
           <a:p>
             <a:fld id="{E74353ED-ACB2-44BF-A903-985B0AF962B7}" type="datetime1">
               <a:rPr lang="en-US" smtClean="0"/>
-              <a:t>3/30/2016</a:t>
+              <a:t>4/1/2016</a:t>
             </a:fld>
             <a:endParaRPr lang="en-US" dirty="0"/>
           </a:p>
@@ -1542,7 +1542,7 @@
           <a:p>
             <a:fld id="{E74353ED-ACB2-44BF-A903-985B0AF962B7}" type="datetime1">
               <a:rPr lang="en-US" smtClean="0"/>
-              <a:t>3/30/2016</a:t>
+              <a:t>4/1/2016</a:t>
             </a:fld>
             <a:endParaRPr lang="en-US" dirty="0"/>
           </a:p>
@@ -25255,20 +25255,7 @@
                 <a:latin typeface="Consolas" panose="020B0609020204030204" pitchFamily="49" charset="0"/>
                 <a:ea typeface="Calibri" panose="020F0502020204030204" pitchFamily="34" charset="0"/>
               </a:rPr>
-              <a:t>.LaunchUriForResultsAsync(launchUri</a:t>
-            </a:r>
-            <a:r>
-              <a:rPr lang="en-US" sz="1632" noProof="1">
-                <a:solidFill>
-                  <a:srgbClr val="000000"/>
-                </a:solidFill>
-                <a:highlight>
-                  <a:srgbClr val="FFFFFF"/>
-                </a:highlight>
-                <a:latin typeface="Consolas" panose="020B0609020204030204" pitchFamily="49" charset="0"/>
-                <a:ea typeface="Calibri" panose="020F0502020204030204" pitchFamily="34" charset="0"/>
-              </a:rPr>
-              <a:t>, options, data);</a:t>
+              <a:t>.LaunchUriForResultsAsync(launchUri, options, data);</a:t>
             </a:r>
           </a:p>
           <a:p>
@@ -25457,7 +25444,6 @@
               <a:rPr lang="en-US" sz="1836" dirty="0"/>
               <a:t>App1</a:t>
             </a:r>
-            <a:endParaRPr lang="en-US" sz="1836" dirty="0"/>
           </a:p>
         </p:txBody>
       </p:sp>
@@ -25487,7 +25473,6 @@
               <a:rPr lang="en-US" sz="1836" dirty="0"/>
               <a:t>App2</a:t>
             </a:r>
-            <a:endParaRPr lang="en-US" sz="1836" dirty="0"/>
           </a:p>
         </p:txBody>
       </p:sp>
@@ -25679,9 +25664,14 @@
               <a:t>Go to </a:t>
             </a:r>
             <a:r>
-              <a:rPr lang="en-US" sz="2800" b="1" dirty="0" smtClean="0"/>
-              <a:t>C:\Labs\CodeLabs-UWP\Workshop\Module1-AdaptiveUI\Source</a:t>
-            </a:r>
+              <a:rPr lang="en-US" sz="2400" b="1" dirty="0" smtClean="0"/>
+              <a:t>C:\</a:t>
+            </a:r>
+            <a:r>
+              <a:rPr lang="en-US" sz="2400" b="1" dirty="0" smtClean="0"/>
+              <a:t>Labs\CodeLabs-UWP\Workshop\Module3-ConnectedApps\Source</a:t>
+            </a:r>
+            <a:endParaRPr lang="en-US" sz="2800" b="1" dirty="0" smtClean="0"/>
           </a:p>
           <a:p>
             <a:pPr marL="514350" indent="-514350">
@@ -27260,10 +27250,6 @@
             <a:r>
               <a:rPr lang="en-GB" dirty="0" smtClean="0"/>
               <a:t>3: </a:t>
-            </a:r>
-            <a:r>
-              <a:rPr lang="en-GB" dirty="0" smtClean="0"/>
-              <a:t/>
             </a:r>
             <a:br>
               <a:rPr lang="en-GB" dirty="0" smtClean="0"/>
@@ -30298,13 +30284,8 @@
           <a:p>
             <a:r>
               <a:rPr lang="en-US" sz="4080" dirty="0"/>
-              <a:t>Mobile Experiences - not just mobile </a:t>
-            </a:r>
-            <a:r>
-              <a:rPr lang="en-US" sz="4080" dirty="0"/>
-              <a:t>devices</a:t>
-            </a:r>
-            <a:endParaRPr lang="en-US" sz="4080" dirty="0"/>
+              <a:t>Mobile Experiences - not just mobile devices</a:t>
+            </a:r>
           </a:p>
         </p:txBody>
       </p:sp>
@@ -30594,16 +30575,7 @@
                 </a:solidFill>
                 <a:latin typeface="+mn-lt"/>
               </a:rPr>
-              <a:t>Available on the </a:t>
-            </a:r>
-            <a:r>
-              <a:rPr lang="en-US" sz="2040" dirty="0">
-                <a:solidFill>
-                  <a:schemeClr val="tx1"/>
-                </a:solidFill>
-                <a:latin typeface="+mn-lt"/>
-              </a:rPr>
-              <a:t>right device at the right time</a:t>
+              <a:t>Available on the right device at the right time</a:t>
             </a:r>
           </a:p>
           <a:p>
@@ -30643,12 +30615,6 @@
               </a:rPr>
               <a:t>Enabling Mobile Experiences with Universal Apps</a:t>
             </a:r>
-            <a:endParaRPr lang="en-US" sz="2040" dirty="0">
-              <a:solidFill>
-                <a:schemeClr val="tx1"/>
-              </a:solidFill>
-              <a:latin typeface="+mn-lt"/>
-            </a:endParaRPr>
           </a:p>
           <a:p>
             <a:pPr>
@@ -30709,7 +30675,6 @@
               <a:rPr lang="en-US" sz="1836" dirty="0"/>
               <a:t>The Experience you want on the device you want</a:t>
             </a:r>
-            <a:endParaRPr lang="en-US" sz="1836" dirty="0"/>
           </a:p>
         </p:txBody>
       </p:sp>
@@ -30760,7 +30725,7 @@
             <a:effectLst/>
             <a:extLst>
               <a:ext uri="{909E8E84-426E-40dd-AFC4-6F175D3DCCD1}">
-                <a14:hiddenFill xmlns="" xmlns:a14="http://schemas.microsoft.com/office/drawing/2010/main">
+                <a14:hiddenFill xmlns:a14="http://schemas.microsoft.com/office/drawing/2010/main" xmlns="">
                   <a:solidFill>
                     <a:srgbClr val="FFFFFF"/>
                   </a:solidFill>
@@ -33138,74 +33103,6 @@
 </file>
 
 <file path=customXml/item1.xml><?xml version="1.0" encoding="utf-8"?>
-<p:properties xmlns:p="http://schemas.microsoft.com/office/2006/metadata/properties" xmlns:xsi="http://www.w3.org/2001/XMLSchema-instance" xmlns:pc="http://schemas.microsoft.com/office/infopath/2007/PartnerControls">
-  <documentManagement>
-    <SharedWithUsers xmlns="f85c541c-390e-4fa8-b262-5da5c5cfad75">
-      <UserInfo>
-        <DisplayName>Jaime Rodriguez</DisplayName>
-        <AccountId>18</AccountId>
-        <AccountType/>
-      </UserInfo>
-      <UserInfo>
-        <DisplayName>Larry Lieberman</DisplayName>
-        <AccountId>9</AccountId>
-        <AccountType/>
-      </UserInfo>
-      <UserInfo>
-        <DisplayName>Jon Galloway</DisplayName>
-        <AccountId>15</AccountId>
-        <AccountType/>
-      </UserInfo>
-      <UserInfo>
-        <DisplayName>Richard diZerega</DisplayName>
-        <AccountId>17</AccountId>
-        <AccountType/>
-      </UserInfo>
-      <UserInfo>
-        <DisplayName>Brian Peek</DisplayName>
-        <AccountId>20</AccountId>
-        <AccountType/>
-      </UserInfo>
-      <UserInfo>
-        <DisplayName>Pete Brown (DX/TED)</DisplayName>
-        <AccountId>12</AccountId>
-        <AccountType/>
-      </UserInfo>
-      <UserInfo>
-        <DisplayName>Petri Tapio Wilhelmsen</DisplayName>
-        <AccountId>13</AccountId>
-        <AccountType/>
-      </UserInfo>
-      <UserInfo>
-        <DisplayName>Andy Wigley</DisplayName>
-        <AccountId>10</AccountId>
-        <AccountType/>
-      </UserInfo>
-      <UserInfo>
-        <DisplayName>Romit Girdhar</DisplayName>
-        <AccountId>11</AccountId>
-        <AccountType/>
-      </UserInfo>
-      <UserInfo>
-        <DisplayName>Thiago Almeida</DisplayName>
-        <AccountId>14</AccountId>
-        <AccountType/>
-      </UserInfo>
-    </SharedWithUsers>
-  </documentManagement>
-</p:properties>
-</file>
-
-<file path=customXml/item2.xml><?xml version="1.0" encoding="utf-8"?>
-<?mso-contentType ?>
-<FormTemplates xmlns="http://schemas.microsoft.com/sharepoint/v3/contenttype/forms">
-  <Display>DocumentLibraryForm</Display>
-  <Edit>DocumentLibraryForm</Edit>
-  <New>DocumentLibraryForm</New>
-</FormTemplates>
-</file>
-
-<file path=customXml/item3.xml><?xml version="1.0" encoding="utf-8"?>
 <ct:contentTypeSchema xmlns:ct="http://schemas.microsoft.com/office/2006/metadata/contentType" xmlns:ma="http://schemas.microsoft.com/office/2006/metadata/properties/metaAttributes" ct:_="" ma:_="" ma:contentTypeName="Document" ma:contentTypeID="0x010100F50271A20F7B3C41B827A8F04D548019" ma:contentTypeVersion="2" ma:contentTypeDescription="Create a new document." ma:contentTypeScope="" ma:versionID="0f5b4adeca3fa452dfd663ff4e0777e3">
   <xsd:schema xmlns:xsd="http://www.w3.org/2001/XMLSchema" xmlns:xs="http://www.w3.org/2001/XMLSchema" xmlns:p="http://schemas.microsoft.com/office/2006/metadata/properties" xmlns:ns2="f85c541c-390e-4fa8-b262-5da5c5cfad75" targetNamespace="http://schemas.microsoft.com/office/2006/metadata/properties" ma:root="true" ma:fieldsID="592d4a22e1cc7090506e0998bb31d05e" ns2:_="">
     <xsd:import namespace="f85c541c-390e-4fa8-b262-5da5c5cfad75"/>
@@ -33353,31 +33250,75 @@
 </ct:contentTypeSchema>
 </file>
 
-<file path=customXml/itemProps1.xml><?xml version="1.0" encoding="utf-8"?>
-<ds:datastoreItem xmlns:ds="http://schemas.openxmlformats.org/officeDocument/2006/customXml" ds:itemID="{F990F116-B58F-4255-B05B-DA3808E0E5C6}">
-  <ds:schemaRefs>
-    <ds:schemaRef ds:uri="http://purl.org/dc/terms/"/>
-    <ds:schemaRef ds:uri="http://schemas.openxmlformats.org/package/2006/metadata/core-properties"/>
-    <ds:schemaRef ds:uri="http://schemas.microsoft.com/office/2006/documentManagement/types"/>
-    <ds:schemaRef ds:uri="http://schemas.microsoft.com/office/infopath/2007/PartnerControls"/>
-    <ds:schemaRef ds:uri="http://purl.org/dc/elements/1.1/"/>
-    <ds:schemaRef ds:uri="http://schemas.microsoft.com/office/2006/metadata/properties"/>
-    <ds:schemaRef ds:uri="f85c541c-390e-4fa8-b262-5da5c5cfad75"/>
-    <ds:schemaRef ds:uri="http://www.w3.org/XML/1998/namespace"/>
-    <ds:schemaRef ds:uri="http://purl.org/dc/dcmitype/"/>
-  </ds:schemaRefs>
-</ds:datastoreItem>
+<file path=customXml/item2.xml><?xml version="1.0" encoding="utf-8"?>
+<?mso-contentType ?>
+<FormTemplates xmlns="http://schemas.microsoft.com/sharepoint/v3/contenttype/forms">
+  <Display>DocumentLibraryForm</Display>
+  <Edit>DocumentLibraryForm</Edit>
+  <New>DocumentLibraryForm</New>
+</FormTemplates>
 </file>
 
-<file path=customXml/itemProps2.xml><?xml version="1.0" encoding="utf-8"?>
-<ds:datastoreItem xmlns:ds="http://schemas.openxmlformats.org/officeDocument/2006/customXml" ds:itemID="{758FDAC0-319D-4A54-8D8E-1D42CB1F8004}">
-  <ds:schemaRefs>
-    <ds:schemaRef ds:uri="http://schemas.microsoft.com/sharepoint/v3/contenttype/forms"/>
-  </ds:schemaRefs>
-</ds:datastoreItem>
+<file path=customXml/item3.xml><?xml version="1.0" encoding="utf-8"?>
+<p:properties xmlns:p="http://schemas.microsoft.com/office/2006/metadata/properties" xmlns:xsi="http://www.w3.org/2001/XMLSchema-instance" xmlns:pc="http://schemas.microsoft.com/office/infopath/2007/PartnerControls">
+  <documentManagement>
+    <SharedWithUsers xmlns="f85c541c-390e-4fa8-b262-5da5c5cfad75">
+      <UserInfo>
+        <DisplayName>Jaime Rodriguez</DisplayName>
+        <AccountId>18</AccountId>
+        <AccountType/>
+      </UserInfo>
+      <UserInfo>
+        <DisplayName>Larry Lieberman</DisplayName>
+        <AccountId>9</AccountId>
+        <AccountType/>
+      </UserInfo>
+      <UserInfo>
+        <DisplayName>Jon Galloway</DisplayName>
+        <AccountId>15</AccountId>
+        <AccountType/>
+      </UserInfo>
+      <UserInfo>
+        <DisplayName>Richard diZerega</DisplayName>
+        <AccountId>17</AccountId>
+        <AccountType/>
+      </UserInfo>
+      <UserInfo>
+        <DisplayName>Brian Peek</DisplayName>
+        <AccountId>20</AccountId>
+        <AccountType/>
+      </UserInfo>
+      <UserInfo>
+        <DisplayName>Pete Brown (DX/TED)</DisplayName>
+        <AccountId>12</AccountId>
+        <AccountType/>
+      </UserInfo>
+      <UserInfo>
+        <DisplayName>Petri Tapio Wilhelmsen</DisplayName>
+        <AccountId>13</AccountId>
+        <AccountType/>
+      </UserInfo>
+      <UserInfo>
+        <DisplayName>Andy Wigley</DisplayName>
+        <AccountId>10</AccountId>
+        <AccountType/>
+      </UserInfo>
+      <UserInfo>
+        <DisplayName>Romit Girdhar</DisplayName>
+        <AccountId>11</AccountId>
+        <AccountType/>
+      </UserInfo>
+      <UserInfo>
+        <DisplayName>Thiago Almeida</DisplayName>
+        <AccountId>14</AccountId>
+        <AccountType/>
+      </UserInfo>
+    </SharedWithUsers>
+  </documentManagement>
+</p:properties>
 </file>
 
-<file path=customXml/itemProps3.xml><?xml version="1.0" encoding="utf-8"?>
+<file path=customXml/itemProps1.xml><?xml version="1.0" encoding="utf-8"?>
 <ds:datastoreItem xmlns:ds="http://schemas.openxmlformats.org/officeDocument/2006/customXml" ds:itemID="{16C79B61-263D-4889-954E-B7F93FBE6617}">
   <ds:schemaRefs>
     <ds:schemaRef ds:uri="http://schemas.microsoft.com/office/2006/metadata/contentType"/>
@@ -33393,4 +33334,28 @@
     <ds:schemaRef ds:uri="http://schemas.microsoft.com/internal/obd"/>
   </ds:schemaRefs>
 </ds:datastoreItem>
+</file>
+
+<file path=customXml/itemProps2.xml><?xml version="1.0" encoding="utf-8"?>
+<ds:datastoreItem xmlns:ds="http://schemas.openxmlformats.org/officeDocument/2006/customXml" ds:itemID="{758FDAC0-319D-4A54-8D8E-1D42CB1F8004}">
+  <ds:schemaRefs>
+    <ds:schemaRef ds:uri="http://schemas.microsoft.com/sharepoint/v3/contenttype/forms"/>
+  </ds:schemaRefs>
+</ds:datastoreItem>
+</file>
+
+<file path=customXml/itemProps3.xml><?xml version="1.0" encoding="utf-8"?>
+<ds:datastoreItem xmlns:ds="http://schemas.openxmlformats.org/officeDocument/2006/customXml" ds:itemID="{F990F116-B58F-4255-B05B-DA3808E0E5C6}">
+  <ds:schemaRefs>
+    <ds:schemaRef ds:uri="http://purl.org/dc/terms/"/>
+    <ds:schemaRef ds:uri="http://schemas.openxmlformats.org/package/2006/metadata/core-properties"/>
+    <ds:schemaRef ds:uri="http://schemas.microsoft.com/office/2006/documentManagement/types"/>
+    <ds:schemaRef ds:uri="http://schemas.microsoft.com/office/infopath/2007/PartnerControls"/>
+    <ds:schemaRef ds:uri="http://purl.org/dc/elements/1.1/"/>
+    <ds:schemaRef ds:uri="http://schemas.microsoft.com/office/2006/metadata/properties"/>
+    <ds:schemaRef ds:uri="f85c541c-390e-4fa8-b262-5da5c5cfad75"/>
+    <ds:schemaRef ds:uri="http://www.w3.org/XML/1998/namespace"/>
+    <ds:schemaRef ds:uri="http://purl.org/dc/dcmitype/"/>
+  </ds:schemaRefs>
+</ds:datastoreItem>
 </file>
</xml_diff>